<commit_message>
Second commit with everything
</commit_message>
<xml_diff>
--- a/Python Tutorial.pptx
+++ b/Python Tutorial.pptx
@@ -5562,6 +5562,18 @@
           <a:bodyPr/>
           <a:lstStyle/>
           <a:p>
+            <a:r>
+              <a:rPr lang="en-US" dirty="0" smtClean="0"/>
+              <a:t>Star Wars special effect team use Python to glue tools </a:t>
+            </a:r>
+            <a:r>
+              <a:rPr lang="en-US" smtClean="0"/>
+              <a:t>using various programming </a:t>
+            </a:r>
+            <a:r>
+              <a:rPr lang="en-US" dirty="0" smtClean="0"/>
+              <a:t>languages</a:t>
+            </a:r>
             <a:endParaRPr lang="en-US" dirty="0"/>
           </a:p>
         </p:txBody>
@@ -5591,7 +5603,7 @@
         </p:blipFill>
         <p:spPr bwMode="auto">
           <a:xfrm>
-            <a:off x="2381250" y="2362200"/>
+            <a:off x="2381250" y="2895600"/>
             <a:ext cx="4381500" cy="2466975"/>
           </a:xfrm>
           <a:prstGeom prst="rect">

</xml_diff>